<commit_message>
Design tests on title bar
</commit_message>
<xml_diff>
--- a/db-gui.pptx
+++ b/db-gui.pptx
@@ -244,7 +244,7 @@
           <a:p>
             <a:fld id="{AF3F4172-BD03-4CCB-BCB1-ADDE057EB4B5}" type="datetimeFigureOut">
               <a:rPr lang="fr-FR" smtClean="0"/>
-              <a:t>18/08/2022</a:t>
+              <a:t>25/08/2022</a:t>
             </a:fld>
             <a:endParaRPr lang="fr-FR"/>
           </a:p>
@@ -414,7 +414,7 @@
           <a:p>
             <a:fld id="{AF3F4172-BD03-4CCB-BCB1-ADDE057EB4B5}" type="datetimeFigureOut">
               <a:rPr lang="fr-FR" smtClean="0"/>
-              <a:t>18/08/2022</a:t>
+              <a:t>25/08/2022</a:t>
             </a:fld>
             <a:endParaRPr lang="fr-FR"/>
           </a:p>
@@ -594,7 +594,7 @@
           <a:p>
             <a:fld id="{AF3F4172-BD03-4CCB-BCB1-ADDE057EB4B5}" type="datetimeFigureOut">
               <a:rPr lang="fr-FR" smtClean="0"/>
-              <a:t>18/08/2022</a:t>
+              <a:t>25/08/2022</a:t>
             </a:fld>
             <a:endParaRPr lang="fr-FR"/>
           </a:p>
@@ -764,7 +764,7 @@
           <a:p>
             <a:fld id="{AF3F4172-BD03-4CCB-BCB1-ADDE057EB4B5}" type="datetimeFigureOut">
               <a:rPr lang="fr-FR" smtClean="0"/>
-              <a:t>18/08/2022</a:t>
+              <a:t>25/08/2022</a:t>
             </a:fld>
             <a:endParaRPr lang="fr-FR"/>
           </a:p>
@@ -1010,7 +1010,7 @@
           <a:p>
             <a:fld id="{AF3F4172-BD03-4CCB-BCB1-ADDE057EB4B5}" type="datetimeFigureOut">
               <a:rPr lang="fr-FR" smtClean="0"/>
-              <a:t>18/08/2022</a:t>
+              <a:t>25/08/2022</a:t>
             </a:fld>
             <a:endParaRPr lang="fr-FR"/>
           </a:p>
@@ -1242,7 +1242,7 @@
           <a:p>
             <a:fld id="{AF3F4172-BD03-4CCB-BCB1-ADDE057EB4B5}" type="datetimeFigureOut">
               <a:rPr lang="fr-FR" smtClean="0"/>
-              <a:t>18/08/2022</a:t>
+              <a:t>25/08/2022</a:t>
             </a:fld>
             <a:endParaRPr lang="fr-FR"/>
           </a:p>
@@ -1609,7 +1609,7 @@
           <a:p>
             <a:fld id="{AF3F4172-BD03-4CCB-BCB1-ADDE057EB4B5}" type="datetimeFigureOut">
               <a:rPr lang="fr-FR" smtClean="0"/>
-              <a:t>18/08/2022</a:t>
+              <a:t>25/08/2022</a:t>
             </a:fld>
             <a:endParaRPr lang="fr-FR"/>
           </a:p>
@@ -1727,7 +1727,7 @@
           <a:p>
             <a:fld id="{AF3F4172-BD03-4CCB-BCB1-ADDE057EB4B5}" type="datetimeFigureOut">
               <a:rPr lang="fr-FR" smtClean="0"/>
-              <a:t>18/08/2022</a:t>
+              <a:t>25/08/2022</a:t>
             </a:fld>
             <a:endParaRPr lang="fr-FR"/>
           </a:p>
@@ -1822,7 +1822,7 @@
           <a:p>
             <a:fld id="{AF3F4172-BD03-4CCB-BCB1-ADDE057EB4B5}" type="datetimeFigureOut">
               <a:rPr lang="fr-FR" smtClean="0"/>
-              <a:t>18/08/2022</a:t>
+              <a:t>25/08/2022</a:t>
             </a:fld>
             <a:endParaRPr lang="fr-FR"/>
           </a:p>
@@ -2099,7 +2099,7 @@
           <a:p>
             <a:fld id="{AF3F4172-BD03-4CCB-BCB1-ADDE057EB4B5}" type="datetimeFigureOut">
               <a:rPr lang="fr-FR" smtClean="0"/>
-              <a:t>18/08/2022</a:t>
+              <a:t>25/08/2022</a:t>
             </a:fld>
             <a:endParaRPr lang="fr-FR"/>
           </a:p>
@@ -2356,7 +2356,7 @@
           <a:p>
             <a:fld id="{AF3F4172-BD03-4CCB-BCB1-ADDE057EB4B5}" type="datetimeFigureOut">
               <a:rPr lang="fr-FR" smtClean="0"/>
-              <a:t>18/08/2022</a:t>
+              <a:t>25/08/2022</a:t>
             </a:fld>
             <a:endParaRPr lang="fr-FR"/>
           </a:p>
@@ -2569,7 +2569,7 @@
           <a:p>
             <a:fld id="{AF3F4172-BD03-4CCB-BCB1-ADDE057EB4B5}" type="datetimeFigureOut">
               <a:rPr lang="fr-FR" smtClean="0"/>
-              <a:t>18/08/2022</a:t>
+              <a:t>25/08/2022</a:t>
             </a:fld>
             <a:endParaRPr lang="fr-FR"/>
           </a:p>
@@ -4345,17 +4345,8 @@
                 <a:rPr lang="en-US" sz="1600" dirty="0">
                   <a:latin typeface="Century Gothic" panose="020B0502020202020204" pitchFamily="34" charset="0"/>
                 </a:rPr>
-                <a:t>Show </a:t>
+                <a:t>List</a:t>
               </a:r>
-              <a:r>
-                <a:rPr lang="en-US" sz="1000" dirty="0">
-                  <a:latin typeface="Century Gothic" panose="020B0502020202020204" pitchFamily="34" charset="0"/>
-                </a:rPr>
-                <a:t>items</a:t>
-              </a:r>
-              <a:endParaRPr lang="en-US" sz="1600" dirty="0">
-                <a:latin typeface="Century Gothic" panose="020B0502020202020204" pitchFamily="34" charset="0"/>
-              </a:endParaRPr>
             </a:p>
           </p:txBody>
         </p:sp>

</xml_diff>